<commit_message>
week 1 ppt upload
</commit_message>
<xml_diff>
--- a/PPT/template.pptx
+++ b/PPT/template.pptx
@@ -5,14 +5,15 @@
     <p:sldMasterId id="2147483648" r:id="rId1"/>
   </p:sldMasterIdLst>
   <p:notesMasterIdLst>
-    <p:notesMasterId r:id="rId4"/>
+    <p:notesMasterId r:id="rId5"/>
   </p:notesMasterIdLst>
   <p:handoutMasterIdLst>
-    <p:handoutMasterId r:id="rId5"/>
+    <p:handoutMasterId r:id="rId6"/>
   </p:handoutMasterIdLst>
   <p:sldIdLst>
     <p:sldId id="1414" r:id="rId2"/>
-    <p:sldId id="1566" r:id="rId3"/>
+    <p:sldId id="1568" r:id="rId3"/>
+    <p:sldId id="1566" r:id="rId4"/>
   </p:sldIdLst>
   <p:sldSz cx="9144000" cy="6858000" type="screen4x3"/>
   <p:notesSz cx="9926638" cy="6797675"/>
@@ -151,6 +152,7 @@
         </p14:section>
         <p14:section name="Untitled Section" id="{9CACB88F-6207-4A79-8889-A4A537B69A16}">
           <p14:sldIdLst>
+            <p14:sldId id="1568"/>
             <p14:sldId id="1566"/>
           </p14:sldIdLst>
         </p14:section>
@@ -2002,29 +2004,7 @@
                 <a:ea typeface="Arial" charset="0"/>
                 <a:cs typeface="Arial" charset="0"/>
               </a:rPr>
-              <a:t>- Week </a:t>
-            </a:r>
-            <a:r>
-              <a:rPr lang="en-US" sz="3600" i="1" dirty="0" smtClean="0">
-                <a:solidFill>
-                  <a:srgbClr val="000000"/>
-                </a:solidFill>
-                <a:latin typeface="Arial Narrow" pitchFamily="34" charset="0"/>
-                <a:ea typeface="Arial" charset="0"/>
-                <a:cs typeface="Arial" charset="0"/>
-              </a:rPr>
-              <a:t>X </a:t>
-            </a:r>
-            <a:r>
-              <a:rPr lang="en-US" sz="3600" i="1" dirty="0" smtClean="0">
-                <a:solidFill>
-                  <a:srgbClr val="000000"/>
-                </a:solidFill>
-                <a:latin typeface="Arial Narrow" pitchFamily="34" charset="0"/>
-                <a:ea typeface="Arial" charset="0"/>
-                <a:cs typeface="Arial" charset="0"/>
-              </a:rPr>
-              <a:t>-</a:t>
+              <a:t>- Week X -</a:t>
             </a:r>
             <a:endParaRPr lang="en-US" sz="3600" i="1" dirty="0">
               <a:solidFill>
@@ -2250,17 +2230,40 @@
           <a:p>
             <a:r>
               <a:rPr lang="en-US" dirty="0" smtClean="0"/>
-              <a:t>week </a:t>
-            </a:r>
-            <a:r>
-              <a:rPr lang="en-US" dirty="0" smtClean="0"/>
-              <a:t>X </a:t>
-            </a:r>
-            <a:r>
-              <a:rPr lang="en-US" dirty="0" smtClean="0"/>
-              <a:t>– Fundamentals of Robot</a:t>
+              <a:t>week X – Fundamentals of Robot</a:t>
             </a:r>
             <a:endParaRPr lang="en-US" dirty="0"/>
+          </a:p>
+        </p:txBody>
+      </p:sp>
+      <p:sp>
+        <p:nvSpPr>
+          <p:cNvPr id="6" name="Date Placeholder 3"/>
+          <p:cNvSpPr>
+            <a:spLocks noGrp="1"/>
+          </p:cNvSpPr>
+          <p:nvPr>
+            <p:ph type="dt" sz="half" idx="2"/>
+          </p:nvPr>
+        </p:nvSpPr>
+        <p:spPr>
+          <a:xfrm>
+            <a:off x="0" y="6446838"/>
+            <a:ext cx="1749972" cy="411162"/>
+          </a:xfrm>
+        </p:spPr>
+        <p:txBody>
+          <a:bodyPr/>
+          <a:lstStyle/>
+          <a:p>
+            <a:pPr>
+              <a:defRPr/>
+            </a:pPr>
+            <a:r>
+              <a:rPr lang="en-US" altLang="ko-KR" smtClean="0"/>
+              <a:t>SH Park &lt;pajoheji0909@snu.ac.kr&gt;</a:t>
+            </a:r>
+            <a:endParaRPr lang="en-US"/>
           </a:p>
         </p:txBody>
       </p:sp>
@@ -2280,6 +2283,674 @@
 </file>
 
 <file path=ppt/slides/slide2.xml><?xml version="1.0" encoding="utf-8"?>
+<p:sld xmlns:a="http://schemas.openxmlformats.org/drawingml/2006/main" xmlns:r="http://schemas.openxmlformats.org/officeDocument/2006/relationships" xmlns:p="http://schemas.openxmlformats.org/presentationml/2006/main">
+  <p:cSld>
+    <p:spTree>
+      <p:nvGrpSpPr>
+        <p:cNvPr id="1" name=""/>
+        <p:cNvGrpSpPr/>
+        <p:nvPr/>
+      </p:nvGrpSpPr>
+      <p:grpSpPr>
+        <a:xfrm>
+          <a:off x="0" y="0"/>
+          <a:ext cx="0" cy="0"/>
+          <a:chOff x="0" y="0"/>
+          <a:chExt cx="0" cy="0"/>
+        </a:xfrm>
+      </p:grpSpPr>
+      <p:sp>
+        <p:nvSpPr>
+          <p:cNvPr id="2" name="Slide Number Placeholder 1"/>
+          <p:cNvSpPr>
+            <a:spLocks noGrp="1"/>
+          </p:cNvSpPr>
+          <p:nvPr>
+            <p:ph type="sldNum" sz="quarter" idx="4"/>
+          </p:nvPr>
+        </p:nvSpPr>
+        <p:spPr/>
+        <p:txBody>
+          <a:bodyPr/>
+          <a:lstStyle/>
+          <a:p>
+            <a:pPr>
+              <a:defRPr/>
+            </a:pPr>
+            <a:fld id="{0AA45A93-FE32-2945-8767-7A7088BDD0C8}" type="slidenum">
+              <a:rPr lang="en-US" smtClean="0"/>
+              <a:pPr>
+                <a:defRPr/>
+              </a:pPr>
+              <a:t>2</a:t>
+            </a:fld>
+            <a:r>
+              <a:rPr lang="en-US" smtClean="0"/>
+              <a:t>/4</a:t>
+            </a:r>
+            <a:endParaRPr lang="en-US" dirty="0"/>
+          </a:p>
+        </p:txBody>
+      </p:sp>
+      <p:sp>
+        <p:nvSpPr>
+          <p:cNvPr id="3" name="Footer Placeholder 2"/>
+          <p:cNvSpPr>
+            <a:spLocks noGrp="1"/>
+          </p:cNvSpPr>
+          <p:nvPr>
+            <p:ph type="ftr" sz="quarter" idx="3"/>
+          </p:nvPr>
+        </p:nvSpPr>
+        <p:spPr/>
+        <p:txBody>
+          <a:bodyPr/>
+          <a:lstStyle/>
+          <a:p>
+            <a:r>
+              <a:rPr lang="en-US" altLang="ko-KR" dirty="0"/>
+              <a:t>Introduction to Robot Making Class</a:t>
+            </a:r>
+          </a:p>
+          <a:p>
+            <a:r>
+              <a:rPr lang="en-US" altLang="ko-KR" dirty="0"/>
+              <a:t>week X – Fundamentals of Robot</a:t>
+            </a:r>
+          </a:p>
+        </p:txBody>
+      </p:sp>
+      <p:sp>
+        <p:nvSpPr>
+          <p:cNvPr id="4" name="TextBox 3"/>
+          <p:cNvSpPr txBox="1"/>
+          <p:nvPr/>
+        </p:nvSpPr>
+        <p:spPr bwMode="auto">
+          <a:xfrm>
+            <a:off x="0" y="532745"/>
+            <a:ext cx="1527982" cy="461665"/>
+          </a:xfrm>
+          <a:prstGeom prst="rect">
+            <a:avLst/>
+          </a:prstGeom>
+          <a:noFill/>
+          <a:ln w="9525">
+            <a:noFill/>
+            <a:miter lim="800000"/>
+            <a:headEnd/>
+            <a:tailEnd/>
+          </a:ln>
+        </p:spPr>
+        <p:txBody>
+          <a:bodyPr vert="horz" wrap="none" lIns="91440" tIns="45720" rIns="91440" bIns="45720" numCol="1" rtlCol="0" anchor="t" anchorCtr="0" compatLnSpc="1">
+            <a:prstTxWarp prst="textNoShape">
+              <a:avLst/>
+            </a:prstTxWarp>
+            <a:spAutoFit/>
+          </a:bodyPr>
+          <a:lstStyle/>
+          <a:p>
+            <a:pPr marL="0" algn="l">
+              <a:spcBef>
+                <a:spcPct val="20000"/>
+              </a:spcBef>
+              <a:buClr>
+                <a:srgbClr val="9999CC"/>
+              </a:buClr>
+              <a:buSzPct val="80000"/>
+            </a:pPr>
+            <a:r>
+              <a:rPr lang="en-US" altLang="ko-KR" sz="2400" kern="0" dirty="0" smtClean="0">
+                <a:solidFill>
+                  <a:srgbClr val="000000"/>
+                </a:solidFill>
+                <a:latin typeface="맑은 고딕" panose="020B0503020000020004" pitchFamily="50" charset="-127"/>
+                <a:ea typeface="맑은 고딕" panose="020B0503020000020004" pitchFamily="50" charset="-127"/>
+              </a:rPr>
+              <a:t>1. Topic1</a:t>
+            </a:r>
+            <a:endParaRPr lang="ko-KR" altLang="en-US" sz="2400" kern="0" dirty="0" smtClean="0">
+              <a:solidFill>
+                <a:srgbClr val="000000"/>
+              </a:solidFill>
+              <a:latin typeface="맑은 고딕" panose="020B0503020000020004" pitchFamily="50" charset="-127"/>
+              <a:ea typeface="맑은 고딕" panose="020B0503020000020004" pitchFamily="50" charset="-127"/>
+            </a:endParaRPr>
+          </a:p>
+        </p:txBody>
+      </p:sp>
+      <p:sp>
+        <p:nvSpPr>
+          <p:cNvPr id="5" name="TextBox 4"/>
+          <p:cNvSpPr txBox="1"/>
+          <p:nvPr/>
+        </p:nvSpPr>
+        <p:spPr bwMode="auto">
+          <a:xfrm>
+            <a:off x="451503" y="1019336"/>
+            <a:ext cx="1313180" cy="400110"/>
+          </a:xfrm>
+          <a:prstGeom prst="rect">
+            <a:avLst/>
+          </a:prstGeom>
+          <a:noFill/>
+          <a:ln w="9525">
+            <a:noFill/>
+            <a:miter lim="800000"/>
+            <a:headEnd/>
+            <a:tailEnd/>
+          </a:ln>
+        </p:spPr>
+        <p:txBody>
+          <a:bodyPr vert="horz" wrap="none" lIns="91440" tIns="45720" rIns="91440" bIns="45720" numCol="1" rtlCol="0" anchor="t" anchorCtr="0" compatLnSpc="1">
+            <a:prstTxWarp prst="textNoShape">
+              <a:avLst/>
+            </a:prstTxWarp>
+            <a:spAutoFit/>
+          </a:bodyPr>
+          <a:lstStyle/>
+          <a:p>
+            <a:pPr marL="0" algn="l">
+              <a:spcBef>
+                <a:spcPct val="20000"/>
+              </a:spcBef>
+              <a:buClr>
+                <a:srgbClr val="9999CC"/>
+              </a:buClr>
+              <a:buSzPct val="80000"/>
+            </a:pPr>
+            <a:r>
+              <a:rPr lang="en-US" altLang="ko-KR" sz="2000" kern="0" dirty="0" smtClean="0">
+                <a:solidFill>
+                  <a:srgbClr val="000000"/>
+                </a:solidFill>
+                <a:latin typeface="맑은 고딕" panose="020B0503020000020004" pitchFamily="50" charset="-127"/>
+                <a:ea typeface="맑은 고딕" panose="020B0503020000020004" pitchFamily="50" charset="-127"/>
+              </a:rPr>
+              <a:t>1.1 sub 1</a:t>
+            </a:r>
+            <a:endParaRPr lang="ko-KR" altLang="en-US" sz="2000" kern="0" dirty="0" smtClean="0">
+              <a:solidFill>
+                <a:srgbClr val="000000"/>
+              </a:solidFill>
+              <a:latin typeface="맑은 고딕" panose="020B0503020000020004" pitchFamily="50" charset="-127"/>
+              <a:ea typeface="맑은 고딕" panose="020B0503020000020004" pitchFamily="50" charset="-127"/>
+            </a:endParaRPr>
+          </a:p>
+        </p:txBody>
+      </p:sp>
+      <p:sp>
+        <p:nvSpPr>
+          <p:cNvPr id="6" name="TextBox 5"/>
+          <p:cNvSpPr txBox="1"/>
+          <p:nvPr/>
+        </p:nvSpPr>
+        <p:spPr bwMode="auto">
+          <a:xfrm>
+            <a:off x="451502" y="2349150"/>
+            <a:ext cx="1313180" cy="400110"/>
+          </a:xfrm>
+          <a:prstGeom prst="rect">
+            <a:avLst/>
+          </a:prstGeom>
+          <a:noFill/>
+          <a:ln w="9525">
+            <a:noFill/>
+            <a:miter lim="800000"/>
+            <a:headEnd/>
+            <a:tailEnd/>
+          </a:ln>
+        </p:spPr>
+        <p:txBody>
+          <a:bodyPr vert="horz" wrap="none" lIns="91440" tIns="45720" rIns="91440" bIns="45720" numCol="1" rtlCol="0" anchor="t" anchorCtr="0" compatLnSpc="1">
+            <a:prstTxWarp prst="textNoShape">
+              <a:avLst/>
+            </a:prstTxWarp>
+            <a:spAutoFit/>
+          </a:bodyPr>
+          <a:lstStyle/>
+          <a:p>
+            <a:pPr marL="0" algn="l">
+              <a:spcBef>
+                <a:spcPct val="20000"/>
+              </a:spcBef>
+              <a:buClr>
+                <a:srgbClr val="9999CC"/>
+              </a:buClr>
+              <a:buSzPct val="80000"/>
+            </a:pPr>
+            <a:r>
+              <a:rPr lang="en-US" altLang="ko-KR" sz="2000" kern="0" dirty="0" smtClean="0">
+                <a:solidFill>
+                  <a:srgbClr val="000000"/>
+                </a:solidFill>
+                <a:latin typeface="맑은 고딕" panose="020B0503020000020004" pitchFamily="50" charset="-127"/>
+                <a:ea typeface="맑은 고딕" panose="020B0503020000020004" pitchFamily="50" charset="-127"/>
+              </a:rPr>
+              <a:t>1.2 sub 2</a:t>
+            </a:r>
+            <a:endParaRPr lang="ko-KR" altLang="en-US" sz="2000" kern="0" dirty="0" smtClean="0">
+              <a:solidFill>
+                <a:srgbClr val="000000"/>
+              </a:solidFill>
+              <a:latin typeface="맑은 고딕" panose="020B0503020000020004" pitchFamily="50" charset="-127"/>
+              <a:ea typeface="맑은 고딕" panose="020B0503020000020004" pitchFamily="50" charset="-127"/>
+            </a:endParaRPr>
+          </a:p>
+        </p:txBody>
+      </p:sp>
+      <p:sp>
+        <p:nvSpPr>
+          <p:cNvPr id="7" name="Title 4"/>
+          <p:cNvSpPr txBox="1">
+            <a:spLocks/>
+          </p:cNvSpPr>
+          <p:nvPr/>
+        </p:nvSpPr>
+        <p:spPr>
+          <a:xfrm>
+            <a:off x="0" y="0"/>
+            <a:ext cx="9144000" cy="523220"/>
+          </a:xfrm>
+          <a:prstGeom prst="rect">
+            <a:avLst/>
+          </a:prstGeom>
+        </p:spPr>
+        <p:txBody>
+          <a:bodyPr>
+            <a:spAutoFit/>
+          </a:bodyPr>
+          <a:lstStyle/>
+          <a:p>
+            <a:pPr>
+              <a:defRPr/>
+            </a:pPr>
+            <a:r>
+              <a:rPr lang="en-US" altLang="ko-KR" sz="2800" kern="0" dirty="0" smtClean="0">
+                <a:solidFill>
+                  <a:schemeClr val="tx1"/>
+                </a:solidFill>
+                <a:latin typeface="맑은 고딕" panose="020B0503020000020004" pitchFamily="50" charset="-127"/>
+                <a:ea typeface="맑은 고딕" panose="020B0503020000020004" pitchFamily="50" charset="-127"/>
+              </a:rPr>
+              <a:t>Index</a:t>
+            </a:r>
+            <a:endParaRPr lang="ko-KR" altLang="en-US" sz="2800" kern="0" spc="-150" dirty="0">
+              <a:solidFill>
+                <a:srgbClr val="00B0F0"/>
+              </a:solidFill>
+              <a:latin typeface="맑은 고딕" panose="020B0503020000020004" pitchFamily="50" charset="-127"/>
+              <a:ea typeface="맑은 고딕" panose="020B0503020000020004" pitchFamily="50" charset="-127"/>
+            </a:endParaRPr>
+          </a:p>
+        </p:txBody>
+      </p:sp>
+      <p:sp>
+        <p:nvSpPr>
+          <p:cNvPr id="8" name="TextBox 7"/>
+          <p:cNvSpPr txBox="1"/>
+          <p:nvPr/>
+        </p:nvSpPr>
+        <p:spPr bwMode="auto">
+          <a:xfrm>
+            <a:off x="963565" y="1419446"/>
+            <a:ext cx="5202065" cy="400110"/>
+          </a:xfrm>
+          <a:prstGeom prst="rect">
+            <a:avLst/>
+          </a:prstGeom>
+          <a:noFill/>
+          <a:ln w="9525">
+            <a:noFill/>
+            <a:miter lim="800000"/>
+            <a:headEnd/>
+            <a:tailEnd/>
+          </a:ln>
+        </p:spPr>
+        <p:txBody>
+          <a:bodyPr vert="horz" wrap="none" lIns="91440" tIns="45720" rIns="91440" bIns="45720" numCol="1" rtlCol="0" anchor="t" anchorCtr="0" compatLnSpc="1">
+            <a:prstTxWarp prst="textNoShape">
+              <a:avLst/>
+            </a:prstTxWarp>
+            <a:spAutoFit/>
+          </a:bodyPr>
+          <a:lstStyle/>
+          <a:p>
+            <a:pPr marL="0" algn="l">
+              <a:spcBef>
+                <a:spcPct val="20000"/>
+              </a:spcBef>
+              <a:buClr>
+                <a:srgbClr val="9999CC"/>
+              </a:buClr>
+              <a:buSzPct val="80000"/>
+            </a:pPr>
+            <a:r>
+              <a:rPr lang="en-US" altLang="ko-KR" sz="2000" kern="0" dirty="0" smtClean="0">
+                <a:solidFill>
+                  <a:srgbClr val="0000FF"/>
+                </a:solidFill>
+                <a:latin typeface="맑은 고딕" panose="020B0503020000020004" pitchFamily="50" charset="-127"/>
+                <a:ea typeface="맑은 고딕" panose="020B0503020000020004" pitchFamily="50" charset="-127"/>
+              </a:rPr>
+              <a:t>- TODO (HIGHLIGHT the current section)</a:t>
+            </a:r>
+            <a:endParaRPr lang="ko-KR" altLang="en-US" sz="2000" kern="0" dirty="0" smtClean="0">
+              <a:solidFill>
+                <a:srgbClr val="0000FF"/>
+              </a:solidFill>
+              <a:latin typeface="맑은 고딕" panose="020B0503020000020004" pitchFamily="50" charset="-127"/>
+              <a:ea typeface="맑은 고딕" panose="020B0503020000020004" pitchFamily="50" charset="-127"/>
+            </a:endParaRPr>
+          </a:p>
+        </p:txBody>
+      </p:sp>
+      <p:sp>
+        <p:nvSpPr>
+          <p:cNvPr id="12" name="TextBox 11"/>
+          <p:cNvSpPr txBox="1"/>
+          <p:nvPr/>
+        </p:nvSpPr>
+        <p:spPr bwMode="auto">
+          <a:xfrm>
+            <a:off x="963564" y="2718993"/>
+            <a:ext cx="1098378" cy="400110"/>
+          </a:xfrm>
+          <a:prstGeom prst="rect">
+            <a:avLst/>
+          </a:prstGeom>
+          <a:noFill/>
+          <a:ln w="9525">
+            <a:noFill/>
+            <a:miter lim="800000"/>
+            <a:headEnd/>
+            <a:tailEnd/>
+          </a:ln>
+        </p:spPr>
+        <p:txBody>
+          <a:bodyPr vert="horz" wrap="none" lIns="91440" tIns="45720" rIns="91440" bIns="45720" numCol="1" rtlCol="0" anchor="t" anchorCtr="0" compatLnSpc="1">
+            <a:prstTxWarp prst="textNoShape">
+              <a:avLst/>
+            </a:prstTxWarp>
+            <a:spAutoFit/>
+          </a:bodyPr>
+          <a:lstStyle/>
+          <a:p>
+            <a:pPr marL="0" algn="l">
+              <a:spcBef>
+                <a:spcPct val="20000"/>
+              </a:spcBef>
+              <a:buClr>
+                <a:srgbClr val="9999CC"/>
+              </a:buClr>
+              <a:buSzPct val="80000"/>
+            </a:pPr>
+            <a:r>
+              <a:rPr lang="en-US" altLang="ko-KR" sz="2000" b="0" kern="0" dirty="0" smtClean="0">
+                <a:solidFill>
+                  <a:srgbClr val="000000"/>
+                </a:solidFill>
+                <a:latin typeface="맑은 고딕" panose="020B0503020000020004" pitchFamily="50" charset="-127"/>
+                <a:ea typeface="맑은 고딕" panose="020B0503020000020004" pitchFamily="50" charset="-127"/>
+              </a:rPr>
+              <a:t>- TODO</a:t>
+            </a:r>
+            <a:endParaRPr lang="ko-KR" altLang="en-US" sz="2000" b="0" kern="0" dirty="0" smtClean="0">
+              <a:solidFill>
+                <a:srgbClr val="000000"/>
+              </a:solidFill>
+              <a:latin typeface="맑은 고딕" panose="020B0503020000020004" pitchFamily="50" charset="-127"/>
+              <a:ea typeface="맑은 고딕" panose="020B0503020000020004" pitchFamily="50" charset="-127"/>
+            </a:endParaRPr>
+          </a:p>
+        </p:txBody>
+      </p:sp>
+      <p:sp>
+        <p:nvSpPr>
+          <p:cNvPr id="13" name="TextBox 12"/>
+          <p:cNvSpPr txBox="1"/>
+          <p:nvPr/>
+        </p:nvSpPr>
+        <p:spPr bwMode="auto">
+          <a:xfrm>
+            <a:off x="0" y="4048807"/>
+            <a:ext cx="1527982" cy="461665"/>
+          </a:xfrm>
+          <a:prstGeom prst="rect">
+            <a:avLst/>
+          </a:prstGeom>
+          <a:noFill/>
+          <a:ln w="9525">
+            <a:noFill/>
+            <a:miter lim="800000"/>
+            <a:headEnd/>
+            <a:tailEnd/>
+          </a:ln>
+        </p:spPr>
+        <p:txBody>
+          <a:bodyPr vert="horz" wrap="none" lIns="91440" tIns="45720" rIns="91440" bIns="45720" numCol="1" rtlCol="0" anchor="t" anchorCtr="0" compatLnSpc="1">
+            <a:prstTxWarp prst="textNoShape">
+              <a:avLst/>
+            </a:prstTxWarp>
+            <a:spAutoFit/>
+          </a:bodyPr>
+          <a:lstStyle/>
+          <a:p>
+            <a:pPr marL="0" algn="l">
+              <a:spcBef>
+                <a:spcPct val="20000"/>
+              </a:spcBef>
+              <a:buClr>
+                <a:srgbClr val="9999CC"/>
+              </a:buClr>
+              <a:buSzPct val="80000"/>
+            </a:pPr>
+            <a:r>
+              <a:rPr lang="en-US" altLang="ko-KR" sz="2400" kern="0" dirty="0">
+                <a:solidFill>
+                  <a:srgbClr val="000000"/>
+                </a:solidFill>
+                <a:latin typeface="맑은 고딕" panose="020B0503020000020004" pitchFamily="50" charset="-127"/>
+                <a:ea typeface="맑은 고딕" panose="020B0503020000020004" pitchFamily="50" charset="-127"/>
+              </a:rPr>
+              <a:t>2</a:t>
+            </a:r>
+            <a:r>
+              <a:rPr lang="en-US" altLang="ko-KR" sz="2400" kern="0" dirty="0" smtClean="0">
+                <a:solidFill>
+                  <a:srgbClr val="000000"/>
+                </a:solidFill>
+                <a:latin typeface="맑은 고딕" panose="020B0503020000020004" pitchFamily="50" charset="-127"/>
+                <a:ea typeface="맑은 고딕" panose="020B0503020000020004" pitchFamily="50" charset="-127"/>
+              </a:rPr>
+              <a:t>. Topic2</a:t>
+            </a:r>
+            <a:endParaRPr lang="ko-KR" altLang="en-US" sz="2400" kern="0" dirty="0" smtClean="0">
+              <a:solidFill>
+                <a:srgbClr val="000000"/>
+              </a:solidFill>
+              <a:latin typeface="맑은 고딕" panose="020B0503020000020004" pitchFamily="50" charset="-127"/>
+              <a:ea typeface="맑은 고딕" panose="020B0503020000020004" pitchFamily="50" charset="-127"/>
+            </a:endParaRPr>
+          </a:p>
+        </p:txBody>
+      </p:sp>
+      <p:sp>
+        <p:nvSpPr>
+          <p:cNvPr id="14" name="TextBox 13"/>
+          <p:cNvSpPr txBox="1"/>
+          <p:nvPr/>
+        </p:nvSpPr>
+        <p:spPr bwMode="auto">
+          <a:xfrm>
+            <a:off x="451503" y="4535398"/>
+            <a:ext cx="1313180" cy="400110"/>
+          </a:xfrm>
+          <a:prstGeom prst="rect">
+            <a:avLst/>
+          </a:prstGeom>
+          <a:noFill/>
+          <a:ln w="9525">
+            <a:noFill/>
+            <a:miter lim="800000"/>
+            <a:headEnd/>
+            <a:tailEnd/>
+          </a:ln>
+        </p:spPr>
+        <p:txBody>
+          <a:bodyPr vert="horz" wrap="none" lIns="91440" tIns="45720" rIns="91440" bIns="45720" numCol="1" rtlCol="0" anchor="t" anchorCtr="0" compatLnSpc="1">
+            <a:prstTxWarp prst="textNoShape">
+              <a:avLst/>
+            </a:prstTxWarp>
+            <a:spAutoFit/>
+          </a:bodyPr>
+          <a:lstStyle/>
+          <a:p>
+            <a:pPr marL="0" algn="l">
+              <a:spcBef>
+                <a:spcPct val="20000"/>
+              </a:spcBef>
+              <a:buClr>
+                <a:srgbClr val="9999CC"/>
+              </a:buClr>
+              <a:buSzPct val="80000"/>
+            </a:pPr>
+            <a:r>
+              <a:rPr lang="en-US" altLang="ko-KR" sz="2000" kern="0" dirty="0">
+                <a:solidFill>
+                  <a:srgbClr val="000000"/>
+                </a:solidFill>
+                <a:latin typeface="맑은 고딕" panose="020B0503020000020004" pitchFamily="50" charset="-127"/>
+                <a:ea typeface="맑은 고딕" panose="020B0503020000020004" pitchFamily="50" charset="-127"/>
+              </a:rPr>
+              <a:t>2</a:t>
+            </a:r>
+            <a:r>
+              <a:rPr lang="en-US" altLang="ko-KR" sz="2000" kern="0" dirty="0" smtClean="0">
+                <a:solidFill>
+                  <a:srgbClr val="000000"/>
+                </a:solidFill>
+                <a:latin typeface="맑은 고딕" panose="020B0503020000020004" pitchFamily="50" charset="-127"/>
+                <a:ea typeface="맑은 고딕" panose="020B0503020000020004" pitchFamily="50" charset="-127"/>
+              </a:rPr>
+              <a:t>.1 sub 1</a:t>
+            </a:r>
+            <a:endParaRPr lang="ko-KR" altLang="en-US" sz="2000" kern="0" dirty="0" smtClean="0">
+              <a:solidFill>
+                <a:srgbClr val="000000"/>
+              </a:solidFill>
+              <a:latin typeface="맑은 고딕" panose="020B0503020000020004" pitchFamily="50" charset="-127"/>
+              <a:ea typeface="맑은 고딕" panose="020B0503020000020004" pitchFamily="50" charset="-127"/>
+            </a:endParaRPr>
+          </a:p>
+        </p:txBody>
+      </p:sp>
+      <p:sp>
+        <p:nvSpPr>
+          <p:cNvPr id="16" name="TextBox 15"/>
+          <p:cNvSpPr txBox="1"/>
+          <p:nvPr/>
+        </p:nvSpPr>
+        <p:spPr bwMode="auto">
+          <a:xfrm>
+            <a:off x="451503" y="5338512"/>
+            <a:ext cx="1313180" cy="400110"/>
+          </a:xfrm>
+          <a:prstGeom prst="rect">
+            <a:avLst/>
+          </a:prstGeom>
+          <a:noFill/>
+          <a:ln w="9525">
+            <a:noFill/>
+            <a:miter lim="800000"/>
+            <a:headEnd/>
+            <a:tailEnd/>
+          </a:ln>
+        </p:spPr>
+        <p:txBody>
+          <a:bodyPr vert="horz" wrap="none" lIns="91440" tIns="45720" rIns="91440" bIns="45720" numCol="1" rtlCol="0" anchor="t" anchorCtr="0" compatLnSpc="1">
+            <a:prstTxWarp prst="textNoShape">
+              <a:avLst/>
+            </a:prstTxWarp>
+            <a:spAutoFit/>
+          </a:bodyPr>
+          <a:lstStyle/>
+          <a:p>
+            <a:pPr marL="0" algn="l">
+              <a:spcBef>
+                <a:spcPct val="20000"/>
+              </a:spcBef>
+              <a:buClr>
+                <a:srgbClr val="9999CC"/>
+              </a:buClr>
+              <a:buSzPct val="80000"/>
+            </a:pPr>
+            <a:r>
+              <a:rPr lang="en-US" altLang="ko-KR" sz="2000" kern="0" dirty="0" smtClean="0">
+                <a:solidFill>
+                  <a:srgbClr val="000000"/>
+                </a:solidFill>
+                <a:latin typeface="맑은 고딕" panose="020B0503020000020004" pitchFamily="50" charset="-127"/>
+                <a:ea typeface="맑은 고딕" panose="020B0503020000020004" pitchFamily="50" charset="-127"/>
+              </a:rPr>
+              <a:t>2.2 sub 2</a:t>
+            </a:r>
+            <a:endParaRPr lang="ko-KR" altLang="en-US" sz="2000" kern="0" dirty="0" smtClean="0">
+              <a:solidFill>
+                <a:srgbClr val="000000"/>
+              </a:solidFill>
+              <a:latin typeface="맑은 고딕" panose="020B0503020000020004" pitchFamily="50" charset="-127"/>
+              <a:ea typeface="맑은 고딕" panose="020B0503020000020004" pitchFamily="50" charset="-127"/>
+            </a:endParaRPr>
+          </a:p>
+        </p:txBody>
+      </p:sp>
+      <p:sp>
+        <p:nvSpPr>
+          <p:cNvPr id="15" name="Date Placeholder 3"/>
+          <p:cNvSpPr>
+            <a:spLocks noGrp="1"/>
+          </p:cNvSpPr>
+          <p:nvPr>
+            <p:ph type="dt" sz="half" idx="2"/>
+          </p:nvPr>
+        </p:nvSpPr>
+        <p:spPr>
+          <a:xfrm>
+            <a:off x="0" y="6446838"/>
+            <a:ext cx="1749972" cy="411162"/>
+          </a:xfrm>
+        </p:spPr>
+        <p:txBody>
+          <a:bodyPr/>
+          <a:lstStyle/>
+          <a:p>
+            <a:pPr>
+              <a:defRPr/>
+            </a:pPr>
+            <a:r>
+              <a:rPr lang="en-US" altLang="ko-KR" smtClean="0"/>
+              <a:t>SH Park &lt;pajoheji0909@snu.ac.kr&gt;</a:t>
+            </a:r>
+            <a:endParaRPr lang="en-US"/>
+          </a:p>
+        </p:txBody>
+      </p:sp>
+    </p:spTree>
+    <p:extLst>
+      <p:ext uri="{BB962C8B-B14F-4D97-AF65-F5344CB8AC3E}">
+        <p14:creationId xmlns:p14="http://schemas.microsoft.com/office/powerpoint/2010/main" val="2736778184"/>
+      </p:ext>
+    </p:extLst>
+  </p:cSld>
+  <p:clrMapOvr>
+    <a:masterClrMapping/>
+  </p:clrMapOvr>
+</p:sld>
+</file>
+
+<file path=ppt/slides/slide3.xml><?xml version="1.0" encoding="utf-8"?>
 <p:sld xmlns:a="http://schemas.openxmlformats.org/drawingml/2006/main" xmlns:r="http://schemas.openxmlformats.org/officeDocument/2006/relationships" xmlns:p="http://schemas.openxmlformats.org/presentationml/2006/main">
   <p:cSld>
     <p:spTree>
@@ -2373,7 +3044,7 @@
               <a:pPr>
                 <a:defRPr/>
               </a:pPr>
-              <a:t>2</a:t>
+              <a:t>3</a:t>
             </a:fld>
             <a:r>
               <a:rPr lang="en-US"/>
@@ -2411,15 +3082,7 @@
           <a:p>
             <a:r>
               <a:rPr lang="en-US" dirty="0" smtClean="0"/>
-              <a:t>week </a:t>
-            </a:r>
-            <a:r>
-              <a:rPr lang="en-US" dirty="0" smtClean="0"/>
-              <a:t>X </a:t>
-            </a:r>
-            <a:r>
-              <a:rPr lang="en-US" dirty="0" smtClean="0"/>
-              <a:t>– Fundamentals of Robot</a:t>
+              <a:t>week X – Fundamentals of Robot</a:t>
             </a:r>
             <a:endParaRPr lang="en-US" dirty="0"/>
           </a:p>
@@ -2923,6 +3586,37 @@
               </a:solidFill>
               <a:latin typeface="Arial Narrow" panose="020B0606020202030204" pitchFamily="34" charset="0"/>
             </a:endParaRPr>
+          </a:p>
+        </p:txBody>
+      </p:sp>
+      <p:sp>
+        <p:nvSpPr>
+          <p:cNvPr id="11" name="Date Placeholder 3"/>
+          <p:cNvSpPr>
+            <a:spLocks noGrp="1"/>
+          </p:cNvSpPr>
+          <p:nvPr>
+            <p:ph type="dt" sz="half" idx="2"/>
+          </p:nvPr>
+        </p:nvSpPr>
+        <p:spPr>
+          <a:xfrm>
+            <a:off x="0" y="6446838"/>
+            <a:ext cx="1749972" cy="411162"/>
+          </a:xfrm>
+        </p:spPr>
+        <p:txBody>
+          <a:bodyPr/>
+          <a:lstStyle/>
+          <a:p>
+            <a:pPr>
+              <a:defRPr/>
+            </a:pPr>
+            <a:r>
+              <a:rPr lang="en-US" altLang="ko-KR" smtClean="0"/>
+              <a:t>SH Park &lt;pajoheji0909@snu.ac.kr&gt;</a:t>
+            </a:r>
+            <a:endParaRPr lang="en-US"/>
           </a:p>
         </p:txBody>
       </p:sp>

</xml_diff>